<commit_message>
If more than one range partitions exist than drop the first one at housekeeping
</commit_message>
<xml_diff>
--- a/doc/2021-12_TriXX_ITTage.pptx
+++ b/doc/2021-12_TriXX_ITTage.pptx
@@ -5,10 +5,10 @@
     <p:sldMasterId id="2147483648" r:id="rId1"/>
   </p:sldMasterIdLst>
   <p:notesMasterIdLst>
-    <p:notesMasterId r:id="rId27"/>
+    <p:notesMasterId r:id="rId28"/>
   </p:notesMasterIdLst>
   <p:handoutMasterIdLst>
-    <p:handoutMasterId r:id="rId28"/>
+    <p:handoutMasterId r:id="rId29"/>
   </p:handoutMasterIdLst>
   <p:sldIdLst>
     <p:sldId id="346" r:id="rId2"/>
@@ -35,7 +35,8 @@
     <p:sldId id="344" r:id="rId23"/>
     <p:sldId id="338" r:id="rId24"/>
     <p:sldId id="334" r:id="rId25"/>
-    <p:sldId id="323" r:id="rId26"/>
+    <p:sldId id="347" r:id="rId26"/>
+    <p:sldId id="323" r:id="rId27"/>
   </p:sldIdLst>
   <p:sldSz cx="9144000" cy="5143500" type="screen16x9"/>
   <p:notesSz cx="6858000" cy="9144000"/>
@@ -397,7 +398,7 @@
           <a:p>
             <a:fld id="{65198459-C4F2-C045-9966-EFD31D2DED12}" type="datetime1">
               <a:rPr lang="de-DE" smtClean="0"/>
-              <a:t>26.11.21</a:t>
+              <a:t>28.11.21</a:t>
             </a:fld>
             <a:endParaRPr lang="de-DE"/>
           </a:p>
@@ -563,7 +564,7 @@
           <a:p>
             <a:fld id="{DFE97338-3F22-2E45-8586-98FF6A44F26F}" type="datetime1">
               <a:rPr lang="de-DE" smtClean="0"/>
-              <a:t>26.11.21</a:t>
+              <a:t>28.11.21</a:t>
             </a:fld>
             <a:endParaRPr lang="de-DE"/>
           </a:p>
@@ -896,7 +897,7 @@
           <a:p>
             <a:fld id="{636B5682-7B65-4740-A04A-D1EDC2EC6356}" type="slidenum">
               <a:rPr lang="de-DE" smtClean="0"/>
-              <a:t>10</a:t>
+              <a:t>9</a:t>
             </a:fld>
             <a:endParaRPr lang="de-DE"/>
           </a:p>
@@ -905,7 +906,7 @@
     </p:spTree>
     <p:extLst>
       <p:ext uri="{BB962C8B-B14F-4D97-AF65-F5344CB8AC3E}">
-        <p14:creationId xmlns:p14="http://schemas.microsoft.com/office/powerpoint/2010/main" val="2279391721"/>
+        <p14:creationId xmlns:p14="http://schemas.microsoft.com/office/powerpoint/2010/main" val="1396730360"/>
       </p:ext>
     </p:extLst>
   </p:cSld>
@@ -980,7 +981,7 @@
           <a:p>
             <a:fld id="{636B5682-7B65-4740-A04A-D1EDC2EC6356}" type="slidenum">
               <a:rPr lang="de-DE" smtClean="0"/>
-              <a:t>14</a:t>
+              <a:t>10</a:t>
             </a:fld>
             <a:endParaRPr lang="de-DE"/>
           </a:p>
@@ -989,7 +990,7 @@
     </p:spTree>
     <p:extLst>
       <p:ext uri="{BB962C8B-B14F-4D97-AF65-F5344CB8AC3E}">
-        <p14:creationId xmlns:p14="http://schemas.microsoft.com/office/powerpoint/2010/main" val="570867473"/>
+        <p14:creationId xmlns:p14="http://schemas.microsoft.com/office/powerpoint/2010/main" val="2279391721"/>
       </p:ext>
     </p:extLst>
   </p:cSld>
@@ -1054,6 +1055,90 @@
             <a:spLocks noGrp="1"/>
           </p:cNvSpPr>
           <p:nvPr>
+            <p:ph type="sldNum" sz="quarter" idx="5"/>
+          </p:nvPr>
+        </p:nvSpPr>
+        <p:spPr/>
+        <p:txBody>
+          <a:bodyPr/>
+          <a:lstStyle/>
+          <a:p>
+            <a:fld id="{636B5682-7B65-4740-A04A-D1EDC2EC6356}" type="slidenum">
+              <a:rPr lang="de-DE" smtClean="0"/>
+              <a:t>14</a:t>
+            </a:fld>
+            <a:endParaRPr lang="de-DE"/>
+          </a:p>
+        </p:txBody>
+      </p:sp>
+    </p:spTree>
+    <p:extLst>
+      <p:ext uri="{BB962C8B-B14F-4D97-AF65-F5344CB8AC3E}">
+        <p14:creationId xmlns:p14="http://schemas.microsoft.com/office/powerpoint/2010/main" val="570867473"/>
+      </p:ext>
+    </p:extLst>
+  </p:cSld>
+  <p:clrMapOvr>
+    <a:masterClrMapping/>
+  </p:clrMapOvr>
+</p:notes>
+</file>
+
+<file path=ppt/notesSlides/notesSlide4.xml><?xml version="1.0" encoding="utf-8"?>
+<p:notes xmlns:a="http://schemas.openxmlformats.org/drawingml/2006/main" xmlns:r="http://schemas.openxmlformats.org/officeDocument/2006/relationships" xmlns:p="http://schemas.openxmlformats.org/presentationml/2006/main">
+  <p:cSld>
+    <p:spTree>
+      <p:nvGrpSpPr>
+        <p:cNvPr id="1" name=""/>
+        <p:cNvGrpSpPr/>
+        <p:nvPr/>
+      </p:nvGrpSpPr>
+      <p:grpSpPr>
+        <a:xfrm>
+          <a:off x="0" y="0"/>
+          <a:ext cx="0" cy="0"/>
+          <a:chOff x="0" y="0"/>
+          <a:chExt cx="0" cy="0"/>
+        </a:xfrm>
+      </p:grpSpPr>
+      <p:sp>
+        <p:nvSpPr>
+          <p:cNvPr id="2" name="Folienbildplatzhalter 1"/>
+          <p:cNvSpPr>
+            <a:spLocks noGrp="1" noRot="1" noChangeAspect="1"/>
+          </p:cNvSpPr>
+          <p:nvPr>
+            <p:ph type="sldImg"/>
+          </p:nvPr>
+        </p:nvSpPr>
+        <p:spPr/>
+      </p:sp>
+      <p:sp>
+        <p:nvSpPr>
+          <p:cNvPr id="3" name="Notizenplatzhalter 2"/>
+          <p:cNvSpPr>
+            <a:spLocks noGrp="1"/>
+          </p:cNvSpPr>
+          <p:nvPr>
+            <p:ph type="body" idx="1"/>
+          </p:nvPr>
+        </p:nvSpPr>
+        <p:spPr/>
+        <p:txBody>
+          <a:bodyPr/>
+          <a:lstStyle/>
+          <a:p>
+            <a:endParaRPr lang="de-DE" dirty="0"/>
+          </a:p>
+        </p:txBody>
+      </p:sp>
+      <p:sp>
+        <p:nvSpPr>
+          <p:cNvPr id="4" name="Foliennummernplatzhalter 3"/>
+          <p:cNvSpPr>
+            <a:spLocks noGrp="1"/>
+          </p:cNvSpPr>
+          <p:nvPr>
             <p:ph type="sldNum" sz="quarter" idx="10"/>
           </p:nvPr>
         </p:nvSpPr>
@@ -1064,7 +1149,7 @@
           <a:p>
             <a:fld id="{636B5682-7B65-4740-A04A-D1EDC2EC6356}" type="slidenum">
               <a:rPr lang="de-DE" smtClean="0"/>
-              <a:t>25</a:t>
+              <a:t>26</a:t>
             </a:fld>
             <a:endParaRPr lang="de-DE"/>
           </a:p>
@@ -6177,7 +6262,7 @@
           </a:prstGeom>
           <a:extLst>
             <a:ext uri="{C572A759-6A51-4108-AA02-DFA0A04FC94B}">
-              <ma14:wrappingTextBoxFlag xmlns:ma14="http://schemas.microsoft.com/office/mac/drawingml/2011/main" xmlns="" val="1"/>
+              <ma14:wrappingTextBoxFlag xmlns="" xmlns:ma14="http://schemas.microsoft.com/office/mac/drawingml/2011/main" val="1"/>
             </a:ext>
           </a:extLst>
         </p:spPr>
@@ -10491,7 +10576,7 @@
           </a:ln>
           <a:extLst>
             <a:ext uri="{C572A759-6A51-4108-AA02-DFA0A04FC94B}">
-              <ma14:wrappingTextBoxFlag xmlns:ma14="http://schemas.microsoft.com/office/mac/drawingml/2011/main" xmlns="" val="1"/>
+              <ma14:wrappingTextBoxFlag xmlns="" xmlns:ma14="http://schemas.microsoft.com/office/mac/drawingml/2011/main" val="1"/>
             </a:ext>
           </a:extLst>
         </p:spPr>
@@ -10814,7 +10899,7 @@
           </a:ln>
           <a:extLst>
             <a:ext uri="{C572A759-6A51-4108-AA02-DFA0A04FC94B}">
-              <ma14:wrappingTextBoxFlag xmlns="" xmlns:ma14="http://schemas.microsoft.com/office/mac/drawingml/2011/main" val="1"/>
+              <ma14:wrappingTextBoxFlag xmlns:ma14="http://schemas.microsoft.com/office/mac/drawingml/2011/main" xmlns="" val="1"/>
             </a:ext>
           </a:extLst>
         </p:spPr>
@@ -10878,7 +10963,7 @@
           </a:ln>
           <a:extLst>
             <a:ext uri="{C572A759-6A51-4108-AA02-DFA0A04FC94B}">
-              <ma14:wrappingTextBoxFlag xmlns="" xmlns:ma14="http://schemas.microsoft.com/office/mac/drawingml/2011/main" val="1"/>
+              <ma14:wrappingTextBoxFlag xmlns:ma14="http://schemas.microsoft.com/office/mac/drawingml/2011/main" xmlns="" val="1"/>
             </a:ext>
           </a:extLst>
         </p:spPr>
@@ -25529,7 +25614,7 @@
               <a:rPr lang="de-DE" dirty="0">
                 <a:latin typeface="+mn-lt"/>
               </a:rPr>
-              <a:t>Beispiel-Durchsatz für räumliche Nähe von DB, TriXX und Kafka mit 3 Worker-Threads und JSON &lt; 4K</a:t>
+              <a:t>Beispiel-Durchsatz mit DB, TriXX und Kafka in lokalem Netz, 3 Worker-Threads und JSON &lt; 4K</a:t>
             </a:r>
           </a:p>
           <a:p>
@@ -26588,23 +26673,7 @@
                 <a:ea typeface="Calibri" charset="0"/>
                 <a:cs typeface="Calibri" charset="0"/>
               </a:rPr>
-              <a:t>Als weitere Schritte im </a:t>
-            </a:r>
-            <a:r>
-              <a:rPr lang="de-DE" b="1">
-                <a:latin typeface="+mn-lt"/>
-                <a:ea typeface="Calibri" charset="0"/>
-                <a:cs typeface="Calibri" charset="0"/>
-              </a:rPr>
-              <a:t>Projekt sind vorgesehen</a:t>
-            </a:r>
-            <a:r>
-              <a:rPr lang="de-DE" b="1" dirty="0">
-                <a:latin typeface="+mn-lt"/>
-                <a:ea typeface="Calibri" charset="0"/>
-                <a:cs typeface="Calibri" charset="0"/>
-              </a:rPr>
-              <a:t>:</a:t>
+              <a:t>Als weitere Schritte im Projekt sind vorgesehen:</a:t>
             </a:r>
           </a:p>
         </p:txBody>
@@ -26839,19 +26908,7 @@
               <a:rPr lang="de-DE" dirty="0">
                 <a:latin typeface="+mn-lt"/>
               </a:rPr>
-              <a:t>API-</a:t>
-            </a:r>
-            <a:r>
-              <a:rPr lang="de-DE" dirty="0" err="1">
-                <a:latin typeface="+mn-lt"/>
-              </a:rPr>
-              <a:t>Schnittestellen</a:t>
-            </a:r>
-            <a:r>
-              <a:rPr lang="de-DE" dirty="0">
-                <a:latin typeface="+mn-lt"/>
-              </a:rPr>
-              <a:t> für Monitoring-Systeme z.B. Prometheus</a:t>
+              <a:t>API-Schnittstellen für Monitoring-Systeme z.B. Prometheus</a:t>
             </a:r>
           </a:p>
         </p:txBody>
@@ -27105,246 +27162,6 @@
       </p:sp>
       <p:sp>
         <p:nvSpPr>
-          <p:cNvPr id="11" name="Textplatzhalter 12">
-            <a:extLst>
-              <a:ext uri="{FF2B5EF4-FFF2-40B4-BE49-F238E27FC236}">
-                <a16:creationId xmlns:a16="http://schemas.microsoft.com/office/drawing/2014/main" id="{5D51DA2B-97F7-EC4D-8077-078AD2A9B965}"/>
-              </a:ext>
-            </a:extLst>
-          </p:cNvPr>
-          <p:cNvSpPr txBox="1">
-            <a:spLocks/>
-          </p:cNvSpPr>
-          <p:nvPr/>
-        </p:nvSpPr>
-        <p:spPr>
-          <a:xfrm>
-            <a:off x="222761" y="4093207"/>
-            <a:ext cx="8623725" cy="418373"/>
-          </a:xfrm>
-          <a:prstGeom prst="rect">
-            <a:avLst/>
-          </a:prstGeom>
-          <a:solidFill>
-            <a:schemeClr val="bg1">
-              <a:lumMod val="95000"/>
-            </a:schemeClr>
-          </a:solidFill>
-        </p:spPr>
-        <p:txBody>
-          <a:bodyPr vert="horz" lIns="0" tIns="0" rIns="0" bIns="0" rtlCol="0">
-            <a:noAutofit/>
-          </a:bodyPr>
-          <a:lstStyle>
-            <a:lvl1pPr marL="222250" indent="-220663" algn="l" defTabSz="457200" rtl="0" eaLnBrk="1" latinLnBrk="0" hangingPunct="1">
-              <a:lnSpc>
-                <a:spcPct val="90000"/>
-              </a:lnSpc>
-              <a:spcBef>
-                <a:spcPts val="0"/>
-              </a:spcBef>
-              <a:spcAft>
-                <a:spcPts val="900"/>
-              </a:spcAft>
-              <a:buClr>
-                <a:srgbClr val="DC2314"/>
-              </a:buClr>
-              <a:buSzPct val="100000"/>
-              <a:buFont typeface="LucidaGrande" charset="0"/>
-              <a:buChar char="•"/>
-              <a:tabLst/>
-              <a:defRPr sz="1600" b="0" i="0" kern="1200" baseline="0">
-                <a:solidFill>
-                  <a:srgbClr val="5F696E"/>
-                </a:solidFill>
-                <a:latin typeface="Calibri Light" charset="0"/>
-                <a:ea typeface="Calibri Light" charset="0"/>
-                <a:cs typeface="Calibri Light" charset="0"/>
-              </a:defRPr>
-            </a:lvl1pPr>
-            <a:lvl2pPr marL="492125" indent="-225425" algn="l" defTabSz="457200" rtl="0" eaLnBrk="1" latinLnBrk="0" hangingPunct="1">
-              <a:lnSpc>
-                <a:spcPct val="90000"/>
-              </a:lnSpc>
-              <a:spcBef>
-                <a:spcPts val="0"/>
-              </a:spcBef>
-              <a:spcAft>
-                <a:spcPts val="900"/>
-              </a:spcAft>
-              <a:buClr>
-                <a:srgbClr val="DC2314"/>
-              </a:buClr>
-              <a:buSzPct val="80000"/>
-              <a:buFont typeface="Symbol" charset="2"/>
-              <a:buChar char="-"/>
-              <a:tabLst/>
-              <a:defRPr sz="1600" b="0" i="0" kern="1200" baseline="0">
-                <a:solidFill>
-                  <a:srgbClr val="5F696E"/>
-                </a:solidFill>
-                <a:latin typeface="Calibri Light" charset="0"/>
-                <a:ea typeface="Calibri Light" charset="0"/>
-                <a:cs typeface="Calibri Light" charset="0"/>
-              </a:defRPr>
-            </a:lvl2pPr>
-            <a:lvl3pPr marL="1157288" indent="-242888" algn="l" defTabSz="457200" rtl="0" eaLnBrk="1" latinLnBrk="0" hangingPunct="1">
-              <a:lnSpc>
-                <a:spcPct val="105000"/>
-              </a:lnSpc>
-              <a:spcBef>
-                <a:spcPts val="0"/>
-              </a:spcBef>
-              <a:buClr>
-                <a:srgbClr val="DC2314"/>
-              </a:buClr>
-              <a:buSzPct val="80000"/>
-              <a:buFont typeface="Symbol" charset="2"/>
-              <a:buChar char="-"/>
-              <a:tabLst/>
-              <a:defRPr sz="1600" kern="1200" baseline="0">
-                <a:solidFill>
-                  <a:schemeClr val="tx1"/>
-                </a:solidFill>
-                <a:latin typeface="Calibri Light"/>
-                <a:ea typeface="+mn-ea"/>
-                <a:cs typeface="+mn-cs"/>
-              </a:defRPr>
-            </a:lvl3pPr>
-            <a:lvl4pPr marL="1657350" indent="-285750" algn="l" defTabSz="457200" rtl="0" eaLnBrk="1" latinLnBrk="0" hangingPunct="1">
-              <a:lnSpc>
-                <a:spcPct val="105000"/>
-              </a:lnSpc>
-              <a:spcBef>
-                <a:spcPts val="0"/>
-              </a:spcBef>
-              <a:buClr>
-                <a:schemeClr val="tx1"/>
-              </a:buClr>
-              <a:buSzPct val="100000"/>
-              <a:buFont typeface="Arial"/>
-              <a:buChar char="•"/>
-              <a:defRPr sz="1600" kern="1200" baseline="0">
-                <a:solidFill>
-                  <a:schemeClr val="tx1"/>
-                </a:solidFill>
-                <a:latin typeface="Calibri Light"/>
-                <a:ea typeface="+mn-ea"/>
-                <a:cs typeface="+mn-cs"/>
-              </a:defRPr>
-            </a:lvl4pPr>
-            <a:lvl5pPr marL="2114550" indent="-285750" algn="l" defTabSz="457200" rtl="0" eaLnBrk="1" latinLnBrk="0" hangingPunct="1">
-              <a:lnSpc>
-                <a:spcPct val="105000"/>
-              </a:lnSpc>
-              <a:spcBef>
-                <a:spcPts val="0"/>
-              </a:spcBef>
-              <a:buClr>
-                <a:schemeClr val="tx1"/>
-              </a:buClr>
-              <a:buSzPct val="100000"/>
-              <a:buFont typeface="Arial"/>
-              <a:buChar char="•"/>
-              <a:defRPr sz="1600" kern="1200" baseline="0">
-                <a:solidFill>
-                  <a:schemeClr val="tx1"/>
-                </a:solidFill>
-                <a:latin typeface="Calibri Light"/>
-                <a:ea typeface="+mn-ea"/>
-                <a:cs typeface="+mn-cs"/>
-              </a:defRPr>
-            </a:lvl5pPr>
-            <a:lvl6pPr marL="2514600" indent="-228600" algn="l" defTabSz="457200" rtl="0" eaLnBrk="1" latinLnBrk="0" hangingPunct="1">
-              <a:spcBef>
-                <a:spcPct val="20000"/>
-              </a:spcBef>
-              <a:buFont typeface="Arial"/>
-              <a:buChar char="•"/>
-              <a:defRPr sz="2000" kern="1200">
-                <a:solidFill>
-                  <a:schemeClr val="tx1"/>
-                </a:solidFill>
-                <a:latin typeface="+mn-lt"/>
-                <a:ea typeface="+mn-ea"/>
-                <a:cs typeface="+mn-cs"/>
-              </a:defRPr>
-            </a:lvl6pPr>
-            <a:lvl7pPr marL="2971800" indent="-228600" algn="l" defTabSz="457200" rtl="0" eaLnBrk="1" latinLnBrk="0" hangingPunct="1">
-              <a:spcBef>
-                <a:spcPct val="20000"/>
-              </a:spcBef>
-              <a:buFont typeface="Arial"/>
-              <a:buChar char="•"/>
-              <a:defRPr sz="2000" kern="1200">
-                <a:solidFill>
-                  <a:schemeClr val="tx1"/>
-                </a:solidFill>
-                <a:latin typeface="+mn-lt"/>
-                <a:ea typeface="+mn-ea"/>
-                <a:cs typeface="+mn-cs"/>
-              </a:defRPr>
-            </a:lvl7pPr>
-            <a:lvl8pPr marL="3429000" indent="-228600" algn="l" defTabSz="457200" rtl="0" eaLnBrk="1" latinLnBrk="0" hangingPunct="1">
-              <a:spcBef>
-                <a:spcPct val="20000"/>
-              </a:spcBef>
-              <a:buFont typeface="Arial"/>
-              <a:buChar char="•"/>
-              <a:defRPr sz="2000" kern="1200">
-                <a:solidFill>
-                  <a:schemeClr val="tx1"/>
-                </a:solidFill>
-                <a:latin typeface="+mn-lt"/>
-                <a:ea typeface="+mn-ea"/>
-                <a:cs typeface="+mn-cs"/>
-              </a:defRPr>
-            </a:lvl8pPr>
-            <a:lvl9pPr marL="3886200" indent="-228600" algn="l" defTabSz="457200" rtl="0" eaLnBrk="1" latinLnBrk="0" hangingPunct="1">
-              <a:spcBef>
-                <a:spcPct val="20000"/>
-              </a:spcBef>
-              <a:buFont typeface="Arial"/>
-              <a:buChar char="•"/>
-              <a:defRPr sz="2000" kern="1200">
-                <a:solidFill>
-                  <a:schemeClr val="tx1"/>
-                </a:solidFill>
-                <a:latin typeface="+mn-lt"/>
-                <a:ea typeface="+mn-ea"/>
-                <a:cs typeface="+mn-cs"/>
-              </a:defRPr>
-            </a:lvl9pPr>
-          </a:lstStyle>
-          <a:p>
-            <a:pPr marL="266700" indent="-177800">
-              <a:buFont typeface="LucidaGrande" charset="0"/>
-              <a:buNone/>
-            </a:pPr>
-            <a:endParaRPr lang="de-DE" sz="100" b="1" dirty="0">
-              <a:latin typeface="+mn-lt"/>
-              <a:ea typeface="Calibri" charset="0"/>
-              <a:cs typeface="Calibri" charset="0"/>
-            </a:endParaRPr>
-          </a:p>
-          <a:p>
-            <a:pPr marL="266700" indent="-177800"/>
-            <a:r>
-              <a:rPr lang="de-DE" dirty="0">
-                <a:solidFill>
-                  <a:schemeClr val="bg1">
-                    <a:lumMod val="65000"/>
-                  </a:schemeClr>
-                </a:solidFill>
-                <a:latin typeface="+mn-lt"/>
-              </a:rPr>
-              <a:t>Etablieren eines fairen Preismodells vs. Bereitstellen als Open Source?</a:t>
-            </a:r>
-          </a:p>
-        </p:txBody>
-      </p:sp>
-      <p:sp>
-        <p:nvSpPr>
           <p:cNvPr id="12" name="Textplatzhalter 12">
             <a:extLst>
               <a:ext uri="{FF2B5EF4-FFF2-40B4-BE49-F238E27FC236}">
@@ -27573,242 +27390,7 @@
               <a:rPr lang="de-DE" dirty="0">
                 <a:latin typeface="+mn-lt"/>
               </a:rPr>
-              <a:t>Etablieren als auch außerhalb des Otto-Kosmos verfügbares Produkt</a:t>
-            </a:r>
-          </a:p>
-        </p:txBody>
-      </p:sp>
-      <p:sp>
-        <p:nvSpPr>
-          <p:cNvPr id="13" name="Textplatzhalter 12">
-            <a:extLst>
-              <a:ext uri="{FF2B5EF4-FFF2-40B4-BE49-F238E27FC236}">
-                <a16:creationId xmlns:a16="http://schemas.microsoft.com/office/drawing/2014/main" id="{487BF164-FB3A-BE42-8E90-43E9C4F18EB9}"/>
-              </a:ext>
-            </a:extLst>
-          </p:cNvPr>
-          <p:cNvSpPr txBox="1">
-            <a:spLocks/>
-          </p:cNvSpPr>
-          <p:nvPr/>
-        </p:nvSpPr>
-        <p:spPr>
-          <a:xfrm>
-            <a:off x="222762" y="3473832"/>
-            <a:ext cx="8623725" cy="418372"/>
-          </a:xfrm>
-          <a:prstGeom prst="rect">
-            <a:avLst/>
-          </a:prstGeom>
-          <a:solidFill>
-            <a:schemeClr val="bg1">
-              <a:lumMod val="95000"/>
-            </a:schemeClr>
-          </a:solidFill>
-        </p:spPr>
-        <p:txBody>
-          <a:bodyPr vert="horz" lIns="0" tIns="0" rIns="0" bIns="0" rtlCol="0">
-            <a:noAutofit/>
-          </a:bodyPr>
-          <a:lstStyle>
-            <a:lvl1pPr marL="222250" indent="-220663" algn="l" defTabSz="457200" rtl="0" eaLnBrk="1" latinLnBrk="0" hangingPunct="1">
-              <a:lnSpc>
-                <a:spcPct val="90000"/>
-              </a:lnSpc>
-              <a:spcBef>
-                <a:spcPts val="0"/>
-              </a:spcBef>
-              <a:spcAft>
-                <a:spcPts val="900"/>
-              </a:spcAft>
-              <a:buClr>
-                <a:srgbClr val="DC2314"/>
-              </a:buClr>
-              <a:buSzPct val="100000"/>
-              <a:buFont typeface="LucidaGrande" charset="0"/>
-              <a:buChar char="•"/>
-              <a:tabLst/>
-              <a:defRPr sz="1600" b="0" i="0" kern="1200" baseline="0">
-                <a:solidFill>
-                  <a:srgbClr val="5F696E"/>
-                </a:solidFill>
-                <a:latin typeface="Calibri Light" charset="0"/>
-                <a:ea typeface="Calibri Light" charset="0"/>
-                <a:cs typeface="Calibri Light" charset="0"/>
-              </a:defRPr>
-            </a:lvl1pPr>
-            <a:lvl2pPr marL="492125" indent="-225425" algn="l" defTabSz="457200" rtl="0" eaLnBrk="1" latinLnBrk="0" hangingPunct="1">
-              <a:lnSpc>
-                <a:spcPct val="90000"/>
-              </a:lnSpc>
-              <a:spcBef>
-                <a:spcPts val="0"/>
-              </a:spcBef>
-              <a:spcAft>
-                <a:spcPts val="900"/>
-              </a:spcAft>
-              <a:buClr>
-                <a:srgbClr val="DC2314"/>
-              </a:buClr>
-              <a:buSzPct val="80000"/>
-              <a:buFont typeface="Symbol" charset="2"/>
-              <a:buChar char="-"/>
-              <a:tabLst/>
-              <a:defRPr sz="1600" b="0" i="0" kern="1200" baseline="0">
-                <a:solidFill>
-                  <a:srgbClr val="5F696E"/>
-                </a:solidFill>
-                <a:latin typeface="Calibri Light" charset="0"/>
-                <a:ea typeface="Calibri Light" charset="0"/>
-                <a:cs typeface="Calibri Light" charset="0"/>
-              </a:defRPr>
-            </a:lvl2pPr>
-            <a:lvl3pPr marL="1157288" indent="-242888" algn="l" defTabSz="457200" rtl="0" eaLnBrk="1" latinLnBrk="0" hangingPunct="1">
-              <a:lnSpc>
-                <a:spcPct val="105000"/>
-              </a:lnSpc>
-              <a:spcBef>
-                <a:spcPts val="0"/>
-              </a:spcBef>
-              <a:buClr>
-                <a:srgbClr val="DC2314"/>
-              </a:buClr>
-              <a:buSzPct val="80000"/>
-              <a:buFont typeface="Symbol" charset="2"/>
-              <a:buChar char="-"/>
-              <a:tabLst/>
-              <a:defRPr sz="1600" kern="1200" baseline="0">
-                <a:solidFill>
-                  <a:schemeClr val="tx1"/>
-                </a:solidFill>
-                <a:latin typeface="Calibri Light"/>
-                <a:ea typeface="+mn-ea"/>
-                <a:cs typeface="+mn-cs"/>
-              </a:defRPr>
-            </a:lvl3pPr>
-            <a:lvl4pPr marL="1657350" indent="-285750" algn="l" defTabSz="457200" rtl="0" eaLnBrk="1" latinLnBrk="0" hangingPunct="1">
-              <a:lnSpc>
-                <a:spcPct val="105000"/>
-              </a:lnSpc>
-              <a:spcBef>
-                <a:spcPts val="0"/>
-              </a:spcBef>
-              <a:buClr>
-                <a:schemeClr val="tx1"/>
-              </a:buClr>
-              <a:buSzPct val="100000"/>
-              <a:buFont typeface="Arial"/>
-              <a:buChar char="•"/>
-              <a:defRPr sz="1600" kern="1200" baseline="0">
-                <a:solidFill>
-                  <a:schemeClr val="tx1"/>
-                </a:solidFill>
-                <a:latin typeface="Calibri Light"/>
-                <a:ea typeface="+mn-ea"/>
-                <a:cs typeface="+mn-cs"/>
-              </a:defRPr>
-            </a:lvl4pPr>
-            <a:lvl5pPr marL="2114550" indent="-285750" algn="l" defTabSz="457200" rtl="0" eaLnBrk="1" latinLnBrk="0" hangingPunct="1">
-              <a:lnSpc>
-                <a:spcPct val="105000"/>
-              </a:lnSpc>
-              <a:spcBef>
-                <a:spcPts val="0"/>
-              </a:spcBef>
-              <a:buClr>
-                <a:schemeClr val="tx1"/>
-              </a:buClr>
-              <a:buSzPct val="100000"/>
-              <a:buFont typeface="Arial"/>
-              <a:buChar char="•"/>
-              <a:defRPr sz="1600" kern="1200" baseline="0">
-                <a:solidFill>
-                  <a:schemeClr val="tx1"/>
-                </a:solidFill>
-                <a:latin typeface="Calibri Light"/>
-                <a:ea typeface="+mn-ea"/>
-                <a:cs typeface="+mn-cs"/>
-              </a:defRPr>
-            </a:lvl5pPr>
-            <a:lvl6pPr marL="2514600" indent="-228600" algn="l" defTabSz="457200" rtl="0" eaLnBrk="1" latinLnBrk="0" hangingPunct="1">
-              <a:spcBef>
-                <a:spcPct val="20000"/>
-              </a:spcBef>
-              <a:buFont typeface="Arial"/>
-              <a:buChar char="•"/>
-              <a:defRPr sz="2000" kern="1200">
-                <a:solidFill>
-                  <a:schemeClr val="tx1"/>
-                </a:solidFill>
-                <a:latin typeface="+mn-lt"/>
-                <a:ea typeface="+mn-ea"/>
-                <a:cs typeface="+mn-cs"/>
-              </a:defRPr>
-            </a:lvl6pPr>
-            <a:lvl7pPr marL="2971800" indent="-228600" algn="l" defTabSz="457200" rtl="0" eaLnBrk="1" latinLnBrk="0" hangingPunct="1">
-              <a:spcBef>
-                <a:spcPct val="20000"/>
-              </a:spcBef>
-              <a:buFont typeface="Arial"/>
-              <a:buChar char="•"/>
-              <a:defRPr sz="2000" kern="1200">
-                <a:solidFill>
-                  <a:schemeClr val="tx1"/>
-                </a:solidFill>
-                <a:latin typeface="+mn-lt"/>
-                <a:ea typeface="+mn-ea"/>
-                <a:cs typeface="+mn-cs"/>
-              </a:defRPr>
-            </a:lvl7pPr>
-            <a:lvl8pPr marL="3429000" indent="-228600" algn="l" defTabSz="457200" rtl="0" eaLnBrk="1" latinLnBrk="0" hangingPunct="1">
-              <a:spcBef>
-                <a:spcPct val="20000"/>
-              </a:spcBef>
-              <a:buFont typeface="Arial"/>
-              <a:buChar char="•"/>
-              <a:defRPr sz="2000" kern="1200">
-                <a:solidFill>
-                  <a:schemeClr val="tx1"/>
-                </a:solidFill>
-                <a:latin typeface="+mn-lt"/>
-                <a:ea typeface="+mn-ea"/>
-                <a:cs typeface="+mn-cs"/>
-              </a:defRPr>
-            </a:lvl8pPr>
-            <a:lvl9pPr marL="3886200" indent="-228600" algn="l" defTabSz="457200" rtl="0" eaLnBrk="1" latinLnBrk="0" hangingPunct="1">
-              <a:spcBef>
-                <a:spcPct val="20000"/>
-              </a:spcBef>
-              <a:buFont typeface="Arial"/>
-              <a:buChar char="•"/>
-              <a:defRPr sz="2000" kern="1200">
-                <a:solidFill>
-                  <a:schemeClr val="tx1"/>
-                </a:solidFill>
-                <a:latin typeface="+mn-lt"/>
-                <a:ea typeface="+mn-ea"/>
-                <a:cs typeface="+mn-cs"/>
-              </a:defRPr>
-            </a:lvl9pPr>
-          </a:lstStyle>
-          <a:p>
-            <a:pPr marL="266700" indent="-177800">
-              <a:buFont typeface="LucidaGrande" charset="0"/>
-              <a:buNone/>
-            </a:pPr>
-            <a:endParaRPr lang="de-DE" sz="100" b="1" dirty="0">
-              <a:latin typeface="+mn-lt"/>
-              <a:ea typeface="Calibri" charset="0"/>
-              <a:cs typeface="Calibri" charset="0"/>
-            </a:endParaRPr>
-          </a:p>
-          <a:p>
-            <a:pPr marL="266700" indent="-177800"/>
-            <a:r>
-              <a:rPr lang="de-DE" dirty="0">
-                <a:latin typeface="+mn-lt"/>
-              </a:rPr>
-              <a:t>Sichern langfristiger Finanzierung des Projektaufwandes (Wartungs-/Supportverträge, Lizenzen)</a:t>
+              <a:t>Bereitstellen als Open Source</a:t>
             </a:r>
           </a:p>
         </p:txBody>
@@ -27966,96 +27548,6 @@
                       </p:childTnLst>
                     </p:cTn>
                   </p:par>
-                  <p:par>
-                    <p:cTn id="15" fill="hold">
-                      <p:stCondLst>
-                        <p:cond delay="indefinite"/>
-                      </p:stCondLst>
-                      <p:childTnLst>
-                        <p:par>
-                          <p:cTn id="16" fill="hold">
-                            <p:stCondLst>
-                              <p:cond delay="0"/>
-                            </p:stCondLst>
-                            <p:childTnLst>
-                              <p:par>
-                                <p:cTn id="17" presetID="1" presetClass="entr" presetSubtype="0" fill="hold" grpId="0" nodeType="clickEffect">
-                                  <p:stCondLst>
-                                    <p:cond delay="0"/>
-                                  </p:stCondLst>
-                                  <p:childTnLst>
-                                    <p:set>
-                                      <p:cBhvr>
-                                        <p:cTn id="18" dur="1" fill="hold">
-                                          <p:stCondLst>
-                                            <p:cond delay="0"/>
-                                          </p:stCondLst>
-                                        </p:cTn>
-                                        <p:tgtEl>
-                                          <p:spTgt spid="13"/>
-                                        </p:tgtEl>
-                                        <p:attrNameLst>
-                                          <p:attrName>style.visibility</p:attrName>
-                                        </p:attrNameLst>
-                                      </p:cBhvr>
-                                      <p:to>
-                                        <p:strVal val="visible"/>
-                                      </p:to>
-                                    </p:set>
-                                  </p:childTnLst>
-                                </p:cTn>
-                              </p:par>
-                            </p:childTnLst>
-                          </p:cTn>
-                        </p:par>
-                      </p:childTnLst>
-                    </p:cTn>
-                  </p:par>
-                  <p:par>
-                    <p:cTn id="19" fill="hold">
-                      <p:stCondLst>
-                        <p:cond delay="indefinite"/>
-                      </p:stCondLst>
-                      <p:childTnLst>
-                        <p:par>
-                          <p:cTn id="20" fill="hold">
-                            <p:stCondLst>
-                              <p:cond delay="0"/>
-                            </p:stCondLst>
-                            <p:childTnLst>
-                              <p:par>
-                                <p:cTn id="21" presetID="1" presetClass="entr" presetSubtype="0" fill="hold" grpId="0" nodeType="clickEffect">
-                                  <p:stCondLst>
-                                    <p:cond delay="0"/>
-                                  </p:stCondLst>
-                                  <p:childTnLst>
-                                    <p:set>
-                                      <p:cBhvr>
-                                        <p:cTn id="22" dur="1" fill="hold">
-                                          <p:stCondLst>
-                                            <p:cond delay="0"/>
-                                          </p:stCondLst>
-                                        </p:cTn>
-                                        <p:tgtEl>
-                                          <p:spTgt spid="11"/>
-                                        </p:tgtEl>
-                                        <p:attrNameLst>
-                                          <p:attrName>style.visibility</p:attrName>
-                                        </p:attrNameLst>
-                                      </p:cBhvr>
-                                      <p:to>
-                                        <p:strVal val="visible"/>
-                                      </p:to>
-                                    </p:set>
-                                  </p:childTnLst>
-                                </p:cTn>
-                              </p:par>
-                            </p:childTnLst>
-                          </p:cTn>
-                        </p:par>
-                      </p:childTnLst>
-                    </p:cTn>
-                  </p:par>
                 </p:childTnLst>
               </p:cTn>
               <p:prevCondLst>
@@ -28080,15 +27572,477 @@
     <p:bldLst>
       <p:bldP spid="9" grpId="0" animBg="1"/>
       <p:bldP spid="10" grpId="0" animBg="1"/>
-      <p:bldP spid="11" grpId="0" animBg="1"/>
       <p:bldP spid="12" grpId="0" animBg="1"/>
-      <p:bldP spid="13" grpId="0" animBg="1"/>
     </p:bldLst>
   </p:timing>
 </p:sld>
 </file>
 
 <file path=ppt/slides/slide24.xml><?xml version="1.0" encoding="utf-8"?>
+<p:sld xmlns:a="http://schemas.openxmlformats.org/drawingml/2006/main" xmlns:r="http://schemas.openxmlformats.org/officeDocument/2006/relationships" xmlns:p="http://schemas.openxmlformats.org/presentationml/2006/main">
+  <p:cSld>
+    <p:spTree>
+      <p:nvGrpSpPr>
+        <p:cNvPr id="1" name=""/>
+        <p:cNvGrpSpPr/>
+        <p:nvPr/>
+      </p:nvGrpSpPr>
+      <p:grpSpPr>
+        <a:xfrm>
+          <a:off x="0" y="0"/>
+          <a:ext cx="0" cy="0"/>
+          <a:chOff x="0" y="0"/>
+          <a:chExt cx="0" cy="0"/>
+        </a:xfrm>
+      </p:grpSpPr>
+      <p:sp>
+        <p:nvSpPr>
+          <p:cNvPr id="4" name="Fußzeilenplatzhalter 3"/>
+          <p:cNvSpPr>
+            <a:spLocks noGrp="1"/>
+          </p:cNvSpPr>
+          <p:nvPr>
+            <p:ph type="ftr" sz="quarter" idx="3"/>
+          </p:nvPr>
+        </p:nvSpPr>
+        <p:spPr>
+          <a:xfrm>
+            <a:off x="6412999" y="4918182"/>
+            <a:ext cx="2173184" cy="273844"/>
+          </a:xfrm>
+        </p:spPr>
+        <p:txBody>
+          <a:bodyPr/>
+          <a:lstStyle/>
+          <a:p>
+            <a:r>
+              <a:rPr lang="de-DE" dirty="0"/>
+              <a:t>Seite</a:t>
+            </a:r>
+          </a:p>
+        </p:txBody>
+      </p:sp>
+      <p:sp>
+        <p:nvSpPr>
+          <p:cNvPr id="5" name="Foliennummernplatzhalter 4"/>
+          <p:cNvSpPr>
+            <a:spLocks noGrp="1"/>
+          </p:cNvSpPr>
+          <p:nvPr>
+            <p:ph type="sldNum" sz="quarter" idx="4"/>
+          </p:nvPr>
+        </p:nvSpPr>
+        <p:spPr>
+          <a:xfrm>
+            <a:off x="8418658" y="4920586"/>
+            <a:ext cx="335050" cy="273844"/>
+          </a:xfrm>
+        </p:spPr>
+        <p:txBody>
+          <a:bodyPr/>
+          <a:lstStyle/>
+          <a:p>
+            <a:fld id="{2DD045F0-8B2A-FA4B-969F-A1574B4A39C0}" type="slidenum">
+              <a:rPr lang="de-DE" smtClean="0"/>
+              <a:pPr/>
+              <a:t>24</a:t>
+            </a:fld>
+            <a:endParaRPr lang="de-DE" dirty="0"/>
+          </a:p>
+        </p:txBody>
+      </p:sp>
+      <p:sp>
+        <p:nvSpPr>
+          <p:cNvPr id="6" name="Textfeld 5">
+            <a:extLst>
+              <a:ext uri="{FF2B5EF4-FFF2-40B4-BE49-F238E27FC236}">
+                <a16:creationId xmlns:a16="http://schemas.microsoft.com/office/drawing/2014/main" id="{D251F692-1371-1548-BA3A-DB8C18A74215}"/>
+              </a:ext>
+            </a:extLst>
+          </p:cNvPr>
+          <p:cNvSpPr txBox="1"/>
+          <p:nvPr/>
+        </p:nvSpPr>
+        <p:spPr>
+          <a:xfrm>
+            <a:off x="1140903" y="3821628"/>
+            <a:ext cx="7113864" cy="914400"/>
+          </a:xfrm>
+          <a:prstGeom prst="rect">
+            <a:avLst/>
+          </a:prstGeom>
+        </p:spPr>
+        <p:txBody>
+          <a:bodyPr vert="horz" wrap="none" lIns="0" tIns="0" rIns="0" bIns="0" rtlCol="0">
+            <a:noAutofit/>
+          </a:bodyPr>
+          <a:lstStyle/>
+          <a:p>
+            <a:endParaRPr lang="de-DE" dirty="0"/>
+          </a:p>
+          <a:p>
+            <a:endParaRPr lang="de-DE" dirty="0"/>
+          </a:p>
+        </p:txBody>
+      </p:sp>
+      <p:sp>
+        <p:nvSpPr>
+          <p:cNvPr id="7" name="Titel 1">
+            <a:extLst>
+              <a:ext uri="{FF2B5EF4-FFF2-40B4-BE49-F238E27FC236}">
+                <a16:creationId xmlns:a16="http://schemas.microsoft.com/office/drawing/2014/main" id="{2D5F59E6-BBCB-3441-BDD3-FC9E3EA38DDD}"/>
+              </a:ext>
+            </a:extLst>
+          </p:cNvPr>
+          <p:cNvSpPr txBox="1">
+            <a:spLocks/>
+          </p:cNvSpPr>
+          <p:nvPr/>
+        </p:nvSpPr>
+        <p:spPr>
+          <a:xfrm>
+            <a:off x="222767" y="334116"/>
+            <a:ext cx="8363416" cy="508925"/>
+          </a:xfrm>
+          <a:prstGeom prst="rect">
+            <a:avLst/>
+          </a:prstGeom>
+        </p:spPr>
+        <p:txBody>
+          <a:bodyPr vert="horz" wrap="square" lIns="0" tIns="0" rIns="0" bIns="0" rtlCol="0" anchor="t" anchorCtr="0">
+            <a:noAutofit/>
+          </a:bodyPr>
+          <a:lstStyle>
+            <a:lvl1pPr algn="l" defTabSz="457200" rtl="0" eaLnBrk="1" latinLnBrk="0" hangingPunct="1">
+              <a:lnSpc>
+                <a:spcPct val="90000"/>
+              </a:lnSpc>
+              <a:spcBef>
+                <a:spcPct val="0"/>
+              </a:spcBef>
+              <a:buNone/>
+              <a:defRPr sz="3300" b="0" i="0" kern="1200" baseline="0">
+                <a:solidFill>
+                  <a:srgbClr val="DC2314"/>
+                </a:solidFill>
+                <a:latin typeface="Calibri Light" charset="0"/>
+                <a:ea typeface="Calibri Light" charset="0"/>
+                <a:cs typeface="Calibri Light" charset="0"/>
+              </a:defRPr>
+            </a:lvl1pPr>
+          </a:lstStyle>
+          <a:p>
+            <a:r>
+              <a:rPr lang="de-DE" sz="2800" b="1" dirty="0"/>
+              <a:t>Verfügbarkeit des Tools als Open Source</a:t>
+            </a:r>
+          </a:p>
+        </p:txBody>
+      </p:sp>
+      <p:sp>
+        <p:nvSpPr>
+          <p:cNvPr id="8" name="Textplatzhalter 12">
+            <a:extLst>
+              <a:ext uri="{FF2B5EF4-FFF2-40B4-BE49-F238E27FC236}">
+                <a16:creationId xmlns:a16="http://schemas.microsoft.com/office/drawing/2014/main" id="{B5972140-158E-8B4A-AEF3-B1651BAB5054}"/>
+              </a:ext>
+            </a:extLst>
+          </p:cNvPr>
+          <p:cNvSpPr txBox="1">
+            <a:spLocks/>
+          </p:cNvSpPr>
+          <p:nvPr/>
+        </p:nvSpPr>
+        <p:spPr>
+          <a:xfrm>
+            <a:off x="222767" y="1370322"/>
+            <a:ext cx="8623725" cy="2775651"/>
+          </a:xfrm>
+          <a:prstGeom prst="rect">
+            <a:avLst/>
+          </a:prstGeom>
+          <a:solidFill>
+            <a:schemeClr val="bg1">
+              <a:lumMod val="95000"/>
+            </a:schemeClr>
+          </a:solidFill>
+        </p:spPr>
+        <p:txBody>
+          <a:bodyPr vert="horz" lIns="0" tIns="0" rIns="0" bIns="0" rtlCol="0">
+            <a:noAutofit/>
+          </a:bodyPr>
+          <a:lstStyle>
+            <a:lvl1pPr marL="222250" indent="-220663" algn="l" defTabSz="457200" rtl="0" eaLnBrk="1" latinLnBrk="0" hangingPunct="1">
+              <a:lnSpc>
+                <a:spcPct val="90000"/>
+              </a:lnSpc>
+              <a:spcBef>
+                <a:spcPts val="0"/>
+              </a:spcBef>
+              <a:spcAft>
+                <a:spcPts val="900"/>
+              </a:spcAft>
+              <a:buClr>
+                <a:srgbClr val="DC2314"/>
+              </a:buClr>
+              <a:buSzPct val="100000"/>
+              <a:buFont typeface="LucidaGrande" charset="0"/>
+              <a:buChar char="•"/>
+              <a:tabLst/>
+              <a:defRPr sz="1600" b="0" i="0" kern="1200" baseline="0">
+                <a:solidFill>
+                  <a:srgbClr val="5F696E"/>
+                </a:solidFill>
+                <a:latin typeface="Calibri Light" charset="0"/>
+                <a:ea typeface="Calibri Light" charset="0"/>
+                <a:cs typeface="Calibri Light" charset="0"/>
+              </a:defRPr>
+            </a:lvl1pPr>
+            <a:lvl2pPr marL="492125" indent="-225425" algn="l" defTabSz="457200" rtl="0" eaLnBrk="1" latinLnBrk="0" hangingPunct="1">
+              <a:lnSpc>
+                <a:spcPct val="90000"/>
+              </a:lnSpc>
+              <a:spcBef>
+                <a:spcPts val="0"/>
+              </a:spcBef>
+              <a:spcAft>
+                <a:spcPts val="900"/>
+              </a:spcAft>
+              <a:buClr>
+                <a:srgbClr val="DC2314"/>
+              </a:buClr>
+              <a:buSzPct val="80000"/>
+              <a:buFont typeface="Symbol" charset="2"/>
+              <a:buChar char="-"/>
+              <a:tabLst/>
+              <a:defRPr sz="1600" b="0" i="0" kern="1200" baseline="0">
+                <a:solidFill>
+                  <a:srgbClr val="5F696E"/>
+                </a:solidFill>
+                <a:latin typeface="Calibri Light" charset="0"/>
+                <a:ea typeface="Calibri Light" charset="0"/>
+                <a:cs typeface="Calibri Light" charset="0"/>
+              </a:defRPr>
+            </a:lvl2pPr>
+            <a:lvl3pPr marL="1157288" indent="-242888" algn="l" defTabSz="457200" rtl="0" eaLnBrk="1" latinLnBrk="0" hangingPunct="1">
+              <a:lnSpc>
+                <a:spcPct val="105000"/>
+              </a:lnSpc>
+              <a:spcBef>
+                <a:spcPts val="0"/>
+              </a:spcBef>
+              <a:buClr>
+                <a:srgbClr val="DC2314"/>
+              </a:buClr>
+              <a:buSzPct val="80000"/>
+              <a:buFont typeface="Symbol" charset="2"/>
+              <a:buChar char="-"/>
+              <a:tabLst/>
+              <a:defRPr sz="1600" kern="1200" baseline="0">
+                <a:solidFill>
+                  <a:schemeClr val="tx1"/>
+                </a:solidFill>
+                <a:latin typeface="Calibri Light"/>
+                <a:ea typeface="+mn-ea"/>
+                <a:cs typeface="+mn-cs"/>
+              </a:defRPr>
+            </a:lvl3pPr>
+            <a:lvl4pPr marL="1657350" indent="-285750" algn="l" defTabSz="457200" rtl="0" eaLnBrk="1" latinLnBrk="0" hangingPunct="1">
+              <a:lnSpc>
+                <a:spcPct val="105000"/>
+              </a:lnSpc>
+              <a:spcBef>
+                <a:spcPts val="0"/>
+              </a:spcBef>
+              <a:buClr>
+                <a:schemeClr val="tx1"/>
+              </a:buClr>
+              <a:buSzPct val="100000"/>
+              <a:buFont typeface="Arial"/>
+              <a:buChar char="•"/>
+              <a:defRPr sz="1600" kern="1200" baseline="0">
+                <a:solidFill>
+                  <a:schemeClr val="tx1"/>
+                </a:solidFill>
+                <a:latin typeface="Calibri Light"/>
+                <a:ea typeface="+mn-ea"/>
+                <a:cs typeface="+mn-cs"/>
+              </a:defRPr>
+            </a:lvl4pPr>
+            <a:lvl5pPr marL="2114550" indent="-285750" algn="l" defTabSz="457200" rtl="0" eaLnBrk="1" latinLnBrk="0" hangingPunct="1">
+              <a:lnSpc>
+                <a:spcPct val="105000"/>
+              </a:lnSpc>
+              <a:spcBef>
+                <a:spcPts val="0"/>
+              </a:spcBef>
+              <a:buClr>
+                <a:schemeClr val="tx1"/>
+              </a:buClr>
+              <a:buSzPct val="100000"/>
+              <a:buFont typeface="Arial"/>
+              <a:buChar char="•"/>
+              <a:defRPr sz="1600" kern="1200" baseline="0">
+                <a:solidFill>
+                  <a:schemeClr val="tx1"/>
+                </a:solidFill>
+                <a:latin typeface="Calibri Light"/>
+                <a:ea typeface="+mn-ea"/>
+                <a:cs typeface="+mn-cs"/>
+              </a:defRPr>
+            </a:lvl5pPr>
+            <a:lvl6pPr marL="2514600" indent="-228600" algn="l" defTabSz="457200" rtl="0" eaLnBrk="1" latinLnBrk="0" hangingPunct="1">
+              <a:spcBef>
+                <a:spcPct val="20000"/>
+              </a:spcBef>
+              <a:buFont typeface="Arial"/>
+              <a:buChar char="•"/>
+              <a:defRPr sz="2000" kern="1200">
+                <a:solidFill>
+                  <a:schemeClr val="tx1"/>
+                </a:solidFill>
+                <a:latin typeface="+mn-lt"/>
+                <a:ea typeface="+mn-ea"/>
+                <a:cs typeface="+mn-cs"/>
+              </a:defRPr>
+            </a:lvl6pPr>
+            <a:lvl7pPr marL="2971800" indent="-228600" algn="l" defTabSz="457200" rtl="0" eaLnBrk="1" latinLnBrk="0" hangingPunct="1">
+              <a:spcBef>
+                <a:spcPct val="20000"/>
+              </a:spcBef>
+              <a:buFont typeface="Arial"/>
+              <a:buChar char="•"/>
+              <a:defRPr sz="2000" kern="1200">
+                <a:solidFill>
+                  <a:schemeClr val="tx1"/>
+                </a:solidFill>
+                <a:latin typeface="+mn-lt"/>
+                <a:ea typeface="+mn-ea"/>
+                <a:cs typeface="+mn-cs"/>
+              </a:defRPr>
+            </a:lvl7pPr>
+            <a:lvl8pPr marL="3429000" indent="-228600" algn="l" defTabSz="457200" rtl="0" eaLnBrk="1" latinLnBrk="0" hangingPunct="1">
+              <a:spcBef>
+                <a:spcPct val="20000"/>
+              </a:spcBef>
+              <a:buFont typeface="Arial"/>
+              <a:buChar char="•"/>
+              <a:defRPr sz="2000" kern="1200">
+                <a:solidFill>
+                  <a:schemeClr val="tx1"/>
+                </a:solidFill>
+                <a:latin typeface="+mn-lt"/>
+                <a:ea typeface="+mn-ea"/>
+                <a:cs typeface="+mn-cs"/>
+              </a:defRPr>
+            </a:lvl8pPr>
+            <a:lvl9pPr marL="3886200" indent="-228600" algn="l" defTabSz="457200" rtl="0" eaLnBrk="1" latinLnBrk="0" hangingPunct="1">
+              <a:spcBef>
+                <a:spcPct val="20000"/>
+              </a:spcBef>
+              <a:buFont typeface="Arial"/>
+              <a:buChar char="•"/>
+              <a:defRPr sz="2000" kern="1200">
+                <a:solidFill>
+                  <a:schemeClr val="tx1"/>
+                </a:solidFill>
+                <a:latin typeface="+mn-lt"/>
+                <a:ea typeface="+mn-ea"/>
+                <a:cs typeface="+mn-cs"/>
+              </a:defRPr>
+            </a:lvl9pPr>
+          </a:lstStyle>
+          <a:p>
+            <a:endParaRPr lang="de-DE" dirty="0"/>
+          </a:p>
+          <a:p>
+            <a:r>
+              <a:rPr lang="de-DE" dirty="0"/>
+              <a:t>Die Bereitstellung von TriXX durch OSP als </a:t>
+            </a:r>
+            <a:r>
+              <a:rPr lang="de-DE" dirty="0" err="1"/>
+              <a:t>OpenSource</a:t>
+            </a:r>
+            <a:r>
+              <a:rPr lang="de-DE" dirty="0"/>
+              <a:t> ist beabsichtigt, aber noch nicht vollzogen.</a:t>
+            </a:r>
+          </a:p>
+          <a:p>
+            <a:r>
+              <a:rPr lang="de-DE" dirty="0"/>
+              <a:t>Die Entscheidung ist getroffen, es müssen aktuell aber noch einige Details geklärt werden. </a:t>
+            </a:r>
+            <a:br>
+              <a:rPr lang="de-DE" dirty="0"/>
+            </a:br>
+            <a:r>
+              <a:rPr lang="de-DE" dirty="0"/>
+              <a:t>Wir erwarten dass dies zum Januar 2022 geklärt ist.</a:t>
+            </a:r>
+          </a:p>
+          <a:p>
+            <a:r>
+              <a:rPr lang="de-DE" dirty="0"/>
+              <a:t>Eventuell muss dabei der Name des Tools noch geändert werden.</a:t>
+            </a:r>
+          </a:p>
+          <a:p>
+            <a:r>
+              <a:rPr lang="de-DE" dirty="0"/>
+              <a:t>Wenn Sie nach der Veröffentlichung von TriXX informiert werden möchten, </a:t>
+            </a:r>
+            <a:br>
+              <a:rPr lang="de-DE" dirty="0"/>
+            </a:br>
+            <a:r>
+              <a:rPr lang="de-DE" dirty="0"/>
+              <a:t>senden Sie bitte ein Mail an </a:t>
+            </a:r>
+            <a:r>
+              <a:rPr lang="de-DE" dirty="0">
+                <a:hlinkClick r:id="rId2"/>
+              </a:rPr>
+              <a:t>Peter.Ramm@ottogroup.com</a:t>
+            </a:r>
+            <a:r>
+              <a:rPr lang="de-DE" dirty="0"/>
+              <a:t>.</a:t>
+            </a:r>
+          </a:p>
+          <a:p>
+            <a:r>
+              <a:rPr lang="de-DE" dirty="0"/>
+              <a:t>Detaillierte Informationen zu TriXX finden Sie bereits jetzt hier:</a:t>
+            </a:r>
+            <a:br>
+              <a:rPr lang="de-DE" dirty="0"/>
+            </a:br>
+            <a:r>
+              <a:rPr lang="de-DE" dirty="0">
+                <a:hlinkClick r:id="rId3"/>
+              </a:rPr>
+              <a:t>https://otto-group-solution-provider.gitlab.io/trixx/trixx.html</a:t>
+            </a:r>
+            <a:endParaRPr lang="de-DE" dirty="0"/>
+          </a:p>
+        </p:txBody>
+      </p:sp>
+    </p:spTree>
+    <p:extLst>
+      <p:ext uri="{BB962C8B-B14F-4D97-AF65-F5344CB8AC3E}">
+        <p14:creationId xmlns:p14="http://schemas.microsoft.com/office/powerpoint/2010/main" val="648921302"/>
+      </p:ext>
+    </p:extLst>
+  </p:cSld>
+  <p:clrMapOvr>
+    <a:masterClrMapping/>
+  </p:clrMapOvr>
+</p:sld>
+</file>
+
+<file path=ppt/slides/slide25.xml><?xml version="1.0" encoding="utf-8"?>
 <p:sld xmlns:a="http://schemas.openxmlformats.org/drawingml/2006/main" xmlns:r="http://schemas.openxmlformats.org/officeDocument/2006/relationships" xmlns:p="http://schemas.openxmlformats.org/presentationml/2006/main">
   <p:cSld>
     <p:spTree>
@@ -28182,7 +28136,7 @@
             <a:fld id="{2DD045F0-8B2A-FA4B-969F-A1574B4A39C0}" type="slidenum">
               <a:rPr lang="de-DE" smtClean="0"/>
               <a:pPr/>
-              <a:t>24</a:t>
+              <a:t>25</a:t>
             </a:fld>
             <a:endParaRPr lang="de-DE" dirty="0"/>
           </a:p>
@@ -28227,12 +28181,17 @@
               <a:rPr lang="de-DE" dirty="0"/>
               <a:t> der Demo:	 </a:t>
             </a:r>
+          </a:p>
+          <a:p>
             <a:r>
               <a:rPr lang="de-DE" dirty="0">
                 <a:hlinkClick r:id="rId2"/>
               </a:rPr>
-              <a:t>https://bit.ly/3isjpJO</a:t>
-            </a:r>
+              <a:t>https://otto-group-solution-provider.gitlab.io/trixx/trixx_demo.html</a:t>
+            </a:r>
+            <a:endParaRPr lang="de-DE" dirty="0"/>
+          </a:p>
+          <a:p>
             <a:endParaRPr lang="de-DE" dirty="0"/>
           </a:p>
           <a:p>
@@ -28243,7 +28202,7 @@
     </p:spTree>
     <p:extLst>
       <p:ext uri="{BB962C8B-B14F-4D97-AF65-F5344CB8AC3E}">
-        <p14:creationId xmlns:p14="http://schemas.microsoft.com/office/powerpoint/2010/main" val="648921302"/>
+        <p14:creationId xmlns:p14="http://schemas.microsoft.com/office/powerpoint/2010/main" val="791981556"/>
       </p:ext>
     </p:extLst>
   </p:cSld>
@@ -28253,7 +28212,7 @@
 </p:sld>
 </file>
 
-<file path=ppt/slides/slide25.xml><?xml version="1.0" encoding="utf-8"?>
+<file path=ppt/slides/slide26.xml><?xml version="1.0" encoding="utf-8"?>
 <p:sld xmlns:a="http://schemas.openxmlformats.org/drawingml/2006/main" xmlns:r="http://schemas.openxmlformats.org/officeDocument/2006/relationships" xmlns:p="http://schemas.openxmlformats.org/presentationml/2006/main">
   <p:cSld>
     <p:spTree>
@@ -40028,10 +39987,10 @@
       </p:sp>
       <p:pic>
         <p:nvPicPr>
-          <p:cNvPr id="11" name="Grafik 10">
+          <p:cNvPr id="6" name="Grafik 5">
             <a:extLst>
               <a:ext uri="{FF2B5EF4-FFF2-40B4-BE49-F238E27FC236}">
-                <a16:creationId xmlns:a16="http://schemas.microsoft.com/office/drawing/2014/main" id="{0345DA03-9463-2744-BB95-02B75EDC3F08}"/>
+                <a16:creationId xmlns:a16="http://schemas.microsoft.com/office/drawing/2014/main" id="{38B7B886-E611-FE41-AFE0-B1197260AC78}"/>
               </a:ext>
             </a:extLst>
           </p:cNvPr>
@@ -40041,15 +40000,15 @@
           <p:nvPr/>
         </p:nvPicPr>
         <p:blipFill>
-          <a:blip r:embed="rId2"/>
+          <a:blip r:embed="rId3"/>
           <a:stretch>
             <a:fillRect/>
           </a:stretch>
         </p:blipFill>
         <p:spPr>
           <a:xfrm>
-            <a:off x="1004746" y="0"/>
-            <a:ext cx="6132635" cy="5143500"/>
+            <a:off x="557817" y="-31173"/>
+            <a:ext cx="6042104" cy="5143500"/>
           </a:xfrm>
           <a:prstGeom prst="rect">
             <a:avLst/>

</xml_diff>